<commit_message>
update first slide for 2024
</commit_message>
<xml_diff>
--- a/slides/01 - T1 - I database NoSQL.pptx
+++ b/slides/01 - T1 - I database NoSQL.pptx
@@ -298,7 +298,7 @@
           <a:p>
             <a:fld id="{02297A90-1AFB-4FA1-ADF2-69FD2D1230BA}" type="datetimeFigureOut">
               <a:rPr lang="en-US" smtClean="0"/>
-              <a:t>1/31/2023</a:t>
+              <a:t>4/5/2024</a:t>
             </a:fld>
             <a:endParaRPr lang="en-US"/>
           </a:p>
@@ -476,7 +476,7 @@
           <a:p>
             <a:fld id="{2D15495C-7C85-4DFE-8C2B-354A7A489EB6}" type="datetimeFigureOut">
               <a:rPr lang="it-IT" smtClean="0"/>
-              <a:t>31/01/2023</a:t>
+              <a:t>05/04/2024</a:t>
             </a:fld>
             <a:endParaRPr lang="it-IT"/>
           </a:p>
@@ -6670,10 +6670,9 @@
           <a:lstStyle/>
           <a:p>
             <a:r>
-              <a:rPr lang="it-IT"/>
-              <a:t>FITSTIC 2023</a:t>
-            </a:r>
-            <a:endParaRPr lang="it-IT" dirty="0"/>
+              <a:rPr lang="it-IT" dirty="0"/>
+              <a:t>FITSTIC 2024</a:t>
+            </a:r>
           </a:p>
         </p:txBody>
       </p:sp>
@@ -10516,15 +10515,7 @@
             <a:pPr lvl="1"/>
             <a:r>
               <a:rPr lang="en-US" dirty="0"/>
-              <a:t>3</a:t>
-            </a:r>
-            <a:r>
-              <a:rPr lang="en-US" baseline="30000" dirty="0"/>
-              <a:t>rd</a:t>
-            </a:r>
-            <a:r>
-              <a:rPr lang="en-US" dirty="0"/>
-              <a:t> year Ph.D. Candidate in Data Science and Computation @ </a:t>
+              <a:t>4th year Ph.D. Candidate in Data Science and Computation @ </a:t>
             </a:r>
             <a:r>
               <a:rPr lang="en-US" dirty="0" err="1"/>
@@ -17406,21 +17397,24 @@
             <p:ph idx="1"/>
           </p:nvPr>
         </p:nvSpPr>
-        <p:spPr/>
+        <p:spPr>
+          <a:xfrm>
+            <a:off x="83127" y="1700499"/>
+            <a:ext cx="12108873" cy="4351338"/>
+          </a:xfrm>
+        </p:spPr>
         <p:txBody>
           <a:bodyPr/>
           <a:lstStyle/>
           <a:p>
             <a:pPr algn="ctr"/>
             <a:r>
-              <a:rPr lang="it-IT" sz="6000" b="1" i="0" u="sng" dirty="0">
-                <a:solidFill>
-                  <a:srgbClr val="212529"/>
-                </a:solidFill>
+              <a:rPr lang="it-IT" sz="4800" b="1" i="0" u="sng" dirty="0">
                 <a:effectLst/>
+                <a:latin typeface="Roboto" panose="02000000000000000000" pitchFamily="2" charset="0"/>
                 <a:hlinkClick r:id="rId2"/>
               </a:rPr>
-              <a:t>tinyurl.com/nosql2023</a:t>
+              <a:t>https://tinyurl.com/fitstic-nosql-2024</a:t>
             </a:r>
             <a:endParaRPr lang="it-IT" sz="6000" b="1" i="0" u="sng" dirty="0">
               <a:solidFill>
@@ -22093,14 +22087,14 @@
             <p:ph idx="1"/>
             <p:extLst>
               <p:ext uri="{D42A27DB-BD31-4B8C-83A1-F6EECF244321}">
-                <p14:modId xmlns:p14="http://schemas.microsoft.com/office/powerpoint/2010/main" val="2915234916"/>
+                <p14:modId xmlns:p14="http://schemas.microsoft.com/office/powerpoint/2010/main" val="1386652385"/>
               </p:ext>
             </p:extLst>
           </p:nvPr>
         </p:nvGraphicFramePr>
         <p:xfrm>
           <a:off x="838200" y="1700213"/>
-          <a:ext cx="10515600" cy="3337560"/>
+          <a:ext cx="10259718" cy="3337560"/>
         </p:xfrm>
         <a:graphic>
           <a:graphicData uri="http://schemas.openxmlformats.org/drawingml/2006/table">
@@ -22109,7 +22103,7 @@
                 <a:tableStyleId>{69012ECD-51FC-41F1-AA8D-1B2483CD663E}</a:tableStyleId>
               </a:tblPr>
               <a:tblGrid>
-                <a:gridCol w="2181837">
+                <a:gridCol w="1925955">
                   <a:extLst>
                     <a:ext uri="{9D8B030D-6E8A-4147-A177-3AD203B41FA5}">
                       <a16:colId xmlns:a16="http://schemas.microsoft.com/office/drawing/2014/main" val="1670948578"/>
@@ -22165,7 +22159,7 @@
                     <a:p>
                       <a:r>
                         <a:rPr lang="it-IT" dirty="0"/>
-                        <a:t>31/01/2023 14-18</a:t>
+                        <a:t>09/04/2024 09-13</a:t>
                       </a:r>
                     </a:p>
                   </a:txBody>
@@ -22203,7 +22197,7 @@
                     <a:p>
                       <a:r>
                         <a:rPr lang="it-IT" dirty="0"/>
-                        <a:t>02/02/2023 14-18</a:t>
+                        <a:t>11/04/2024 09-13</a:t>
                       </a:r>
                     </a:p>
                   </a:txBody>
@@ -22244,7 +22238,7 @@
                     <a:p>
                       <a:r>
                         <a:rPr lang="it-IT" dirty="0"/>
-                        <a:t>16/02/2023 14-18</a:t>
+                        <a:t>16/04/2024 09-13</a:t>
                       </a:r>
                     </a:p>
                   </a:txBody>
@@ -22285,7 +22279,7 @@
                     <a:p>
                       <a:r>
                         <a:rPr lang="it-IT" dirty="0"/>
-                        <a:t>17/02/2023 14-18</a:t>
+                        <a:t>18/04/2024 09-13</a:t>
                       </a:r>
                     </a:p>
                   </a:txBody>
@@ -22318,7 +22312,7 @@
                     <a:p>
                       <a:r>
                         <a:rPr lang="it-IT" dirty="0"/>
-                        <a:t>22/02/2023 14-18</a:t>
+                        <a:t>22/04/2024 09-13</a:t>
                       </a:r>
                     </a:p>
                   </a:txBody>
@@ -22359,7 +22353,7 @@
                     <a:p>
                       <a:r>
                         <a:rPr lang="it-IT" dirty="0"/>
-                        <a:t>23/02/2023 14-18</a:t>
+                        <a:t>23/04/2024 09-13</a:t>
                       </a:r>
                     </a:p>
                   </a:txBody>
@@ -22397,7 +22391,7 @@
                     <a:p>
                       <a:r>
                         <a:rPr lang="it-IT" dirty="0"/>
-                        <a:t>02/03/2023 14-18</a:t>
+                        <a:t>30/04/2024 09-13</a:t>
                       </a:r>
                     </a:p>
                   </a:txBody>
@@ -22451,7 +22445,7 @@
                     <a:p>
                       <a:r>
                         <a:rPr lang="it-IT" dirty="0"/>
-                        <a:t>09/03/2023 14-16</a:t>
+                        <a:t>02/05/2024 10-12</a:t>
                       </a:r>
                     </a:p>
                   </a:txBody>

</xml_diff>